<commit_message>
Prepare documents for onboarding
</commit_message>
<xml_diff>
--- a/SBOM-TOOL.pptx
+++ b/SBOM-TOOL.pptx
@@ -110,6 +110,11 @@
       </a:defRPr>
     </a:lvl9pPr>
   </p:defaultTextStyle>
+  <p:extLst>
+    <p:ext uri="{EFAFB233-063F-42B5-8137-9DF3F51BA10A}">
+      <p15:sldGuideLst xmlns:p15="http://schemas.microsoft.com/office/powerpoint/2012/main"/>
+    </p:ext>
+  </p:extLst>
 </p:presentation>
 </file>
 
@@ -244,7 +249,7 @@
           <a:p>
             <a:fld id="{36AC9067-9EB7-441C-97E3-AF0BF3AA0E29}" type="datetimeFigureOut">
               <a:rPr lang="en-US" smtClean="0"/>
-              <a:t>10/27/2022</a:t>
+              <a:t>12/8/2022</a:t>
             </a:fld>
             <a:endParaRPr lang="en-US"/>
           </a:p>
@@ -414,7 +419,7 @@
           <a:p>
             <a:fld id="{36AC9067-9EB7-441C-97E3-AF0BF3AA0E29}" type="datetimeFigureOut">
               <a:rPr lang="en-US" smtClean="0"/>
-              <a:t>10/27/2022</a:t>
+              <a:t>12/8/2022</a:t>
             </a:fld>
             <a:endParaRPr lang="en-US"/>
           </a:p>
@@ -594,7 +599,7 @@
           <a:p>
             <a:fld id="{36AC9067-9EB7-441C-97E3-AF0BF3AA0E29}" type="datetimeFigureOut">
               <a:rPr lang="en-US" smtClean="0"/>
-              <a:t>10/27/2022</a:t>
+              <a:t>12/8/2022</a:t>
             </a:fld>
             <a:endParaRPr lang="en-US"/>
           </a:p>
@@ -764,7 +769,7 @@
           <a:p>
             <a:fld id="{36AC9067-9EB7-441C-97E3-AF0BF3AA0E29}" type="datetimeFigureOut">
               <a:rPr lang="en-US" smtClean="0"/>
-              <a:t>10/27/2022</a:t>
+              <a:t>12/8/2022</a:t>
             </a:fld>
             <a:endParaRPr lang="en-US"/>
           </a:p>
@@ -1010,7 +1015,7 @@
           <a:p>
             <a:fld id="{36AC9067-9EB7-441C-97E3-AF0BF3AA0E29}" type="datetimeFigureOut">
               <a:rPr lang="en-US" smtClean="0"/>
-              <a:t>10/27/2022</a:t>
+              <a:t>12/8/2022</a:t>
             </a:fld>
             <a:endParaRPr lang="en-US"/>
           </a:p>
@@ -1242,7 +1247,7 @@
           <a:p>
             <a:fld id="{36AC9067-9EB7-441C-97E3-AF0BF3AA0E29}" type="datetimeFigureOut">
               <a:rPr lang="en-US" smtClean="0"/>
-              <a:t>10/27/2022</a:t>
+              <a:t>12/8/2022</a:t>
             </a:fld>
             <a:endParaRPr lang="en-US"/>
           </a:p>
@@ -1609,7 +1614,7 @@
           <a:p>
             <a:fld id="{36AC9067-9EB7-441C-97E3-AF0BF3AA0E29}" type="datetimeFigureOut">
               <a:rPr lang="en-US" smtClean="0"/>
-              <a:t>10/27/2022</a:t>
+              <a:t>12/8/2022</a:t>
             </a:fld>
             <a:endParaRPr lang="en-US"/>
           </a:p>
@@ -1727,7 +1732,7 @@
           <a:p>
             <a:fld id="{36AC9067-9EB7-441C-97E3-AF0BF3AA0E29}" type="datetimeFigureOut">
               <a:rPr lang="en-US" smtClean="0"/>
-              <a:t>10/27/2022</a:t>
+              <a:t>12/8/2022</a:t>
             </a:fld>
             <a:endParaRPr lang="en-US"/>
           </a:p>
@@ -1822,7 +1827,7 @@
           <a:p>
             <a:fld id="{36AC9067-9EB7-441C-97E3-AF0BF3AA0E29}" type="datetimeFigureOut">
               <a:rPr lang="en-US" smtClean="0"/>
-              <a:t>10/27/2022</a:t>
+              <a:t>12/8/2022</a:t>
             </a:fld>
             <a:endParaRPr lang="en-US"/>
           </a:p>
@@ -2099,7 +2104,7 @@
           <a:p>
             <a:fld id="{36AC9067-9EB7-441C-97E3-AF0BF3AA0E29}" type="datetimeFigureOut">
               <a:rPr lang="en-US" smtClean="0"/>
-              <a:t>10/27/2022</a:t>
+              <a:t>12/8/2022</a:t>
             </a:fld>
             <a:endParaRPr lang="en-US"/>
           </a:p>
@@ -2352,7 +2357,7 @@
           <a:p>
             <a:fld id="{36AC9067-9EB7-441C-97E3-AF0BF3AA0E29}" type="datetimeFigureOut">
               <a:rPr lang="en-US" smtClean="0"/>
-              <a:t>10/27/2022</a:t>
+              <a:t>12/8/2022</a:t>
             </a:fld>
             <a:endParaRPr lang="en-US"/>
           </a:p>
@@ -2565,7 +2570,7 @@
           <a:p>
             <a:fld id="{36AC9067-9EB7-441C-97E3-AF0BF3AA0E29}" type="datetimeFigureOut">
               <a:rPr lang="en-US" smtClean="0"/>
-              <a:t>10/27/2022</a:t>
+              <a:t>12/8/2022</a:t>
             </a:fld>
             <a:endParaRPr lang="en-US"/>
           </a:p>
@@ -3276,7 +3281,6 @@
               <a:rPr lang="en-US" dirty="0" smtClean="0"/>
               <a:t>eport components and relationships</a:t>
             </a:r>
-            <a:endParaRPr lang="en-US" dirty="0" smtClean="0"/>
           </a:p>
           <a:p>
             <a:r>
@@ -3371,17 +3375,13 @@
             </a:r>
             <a:r>
               <a:rPr lang="en-US" dirty="0" smtClean="0"/>
-              <a:t> not supported</a:t>
-            </a:r>
-          </a:p>
-          <a:p>
+              <a:t> not </a:t>
+            </a:r>
             <a:r>
               <a:rPr lang="en-US" dirty="0" smtClean="0"/>
-              <a:t>Lots of intertwining code (from an intern’s perspective :)</a:t>
-            </a:r>
-          </a:p>
-          <a:p>
-            <a:endParaRPr lang="en-US" dirty="0"/>
+              <a:t>supported</a:t>
+            </a:r>
+            <a:endParaRPr lang="en-US" dirty="0" smtClean="0"/>
           </a:p>
         </p:txBody>
       </p:sp>

</xml_diff>